<commit_message>
Added slides for multi-objective optimization
</commit_message>
<xml_diff>
--- a/optimization-methods-for-artificial-intelligence/optimization-continuous.pptx
+++ b/optimization-methods-for-artificial-intelligence/optimization-continuous.pptx
@@ -2364,6 +2364,90 @@
           </a:p>
         </p:txBody>
       </p:sp>
+      <p:pic>
+        <p:nvPicPr>
+          <p:cNvPr id="6" name="Picture 2">
+            <a:extLst>
+              <a:ext uri="{FF2B5EF4-FFF2-40B4-BE49-F238E27FC236}">
+                <a16:creationId xmlns:a16="http://schemas.microsoft.com/office/drawing/2014/main" id="{6E214693-AB7E-4C54-8D7C-0391735F7C4F}"/>
+              </a:ext>
+            </a:extLst>
+          </p:cNvPr>
+          <p:cNvPicPr>
+            <a:picLocks noChangeAspect="1" noChangeArrowheads="1"/>
+          </p:cNvPicPr>
+          <p:nvPr/>
+        </p:nvPicPr>
+        <p:blipFill rotWithShape="1">
+          <a:blip r:embed="rId2">
+            <a:extLst>
+              <a:ext uri="{BEBA8EAE-BF5A-486C-A8C5-ECC9F3942E4B}">
+                <a14:imgProps xmlns:a14="http://schemas.microsoft.com/office/drawing/2010/main">
+                  <a14:imgLayer r:embed="rId3">
+                    <a14:imgEffect>
+                      <a14:backgroundRemoval t="22283" b="75673" l="54554" r="90983"/>
+                    </a14:imgEffect>
+                  </a14:imgLayer>
+                </a14:imgProps>
+              </a:ext>
+              <a:ext uri="{28A0092B-C50C-407E-A947-70E740481C1C}">
+                <a14:useLocalDpi xmlns:a14="http://schemas.microsoft.com/office/drawing/2010/main" val="0"/>
+              </a:ext>
+            </a:extLst>
+          </a:blip>
+          <a:srcRect l="50000" t="15610" r="4463" b="17653"/>
+          <a:stretch/>
+        </p:blipFill>
+        <p:spPr bwMode="auto">
+          <a:xfrm>
+            <a:off x="4938382" y="1037974"/>
+            <a:ext cx="1295445" cy="884352"/>
+          </a:xfrm>
+          <a:prstGeom prst="rect">
+            <a:avLst/>
+          </a:prstGeom>
+          <a:noFill/>
+          <a:extLst>
+            <a:ext uri="{909E8E84-426E-40DD-AFC4-6F175D3DCCD1}">
+              <a14:hiddenFill xmlns:a14="http://schemas.microsoft.com/office/drawing/2010/main">
+                <a:solidFill>
+                  <a:srgbClr val="FFFFFF"/>
+                </a:solidFill>
+              </a14:hiddenFill>
+            </a:ext>
+          </a:extLst>
+        </p:spPr>
+      </p:pic>
+      <p:pic>
+        <p:nvPicPr>
+          <p:cNvPr id="7" name="Image 6">
+            <a:extLst>
+              <a:ext uri="{FF2B5EF4-FFF2-40B4-BE49-F238E27FC236}">
+                <a16:creationId xmlns:a16="http://schemas.microsoft.com/office/drawing/2014/main" id="{414D43F9-35B6-46FA-B5D4-8F2F1AA72ED1}"/>
+              </a:ext>
+            </a:extLst>
+          </p:cNvPr>
+          <p:cNvPicPr>
+            <a:picLocks noChangeAspect="1"/>
+          </p:cNvPicPr>
+          <p:nvPr/>
+        </p:nvPicPr>
+        <p:blipFill>
+          <a:blip r:embed="rId4"/>
+          <a:stretch>
+            <a:fillRect/>
+          </a:stretch>
+        </p:blipFill>
+        <p:spPr>
+          <a:xfrm>
+            <a:off x="6383826" y="1073027"/>
+            <a:ext cx="1642424" cy="574848"/>
+          </a:xfrm>
+          <a:prstGeom prst="rect">
+            <a:avLst/>
+          </a:prstGeom>
+        </p:spPr>
+      </p:pic>
     </p:spTree>
     <p:extLst>
       <p:ext uri="{BB962C8B-B14F-4D97-AF65-F5344CB8AC3E}">

</xml_diff>